<commit_message>
update storage design documentation
</commit_message>
<xml_diff>
--- a/docs/images/StorageClassDiagram.pptx
+++ b/docs/images/StorageClassDiagram.pptx
@@ -217,7 +217,7 @@
           <a:p>
             <a:fld id="{41BD1D1A-6182-4434-B651-E6786C99D69D}" type="datetimeFigureOut">
               <a:rPr lang="en-AU" smtClean="0"/>
-              <a:t>30/01/2017</a:t>
+              <a:t>20/8/18</a:t>
             </a:fld>
             <a:endParaRPr lang="en-AU"/>
           </a:p>
@@ -383,7 +383,7 @@
             <a:fld id="{AF301891-4E62-472A-98E9-95DBD40531A4}" type="datetimeFigureOut">
               <a:rPr lang="en-SG" smtClean="0"/>
               <a:pPr/>
-              <a:t>30/1/2017</a:t>
+              <a:t>20/8/18</a:t>
             </a:fld>
             <a:endParaRPr lang="en-SG"/>
           </a:p>
@@ -938,7 +938,7 @@
             <a:fld id="{1D8BD707-D9CF-40AE-B4C6-C98DA3205C09}" type="datetimeFigureOut">
               <a:rPr lang="en-US" smtClean="0"/>
               <a:pPr/>
-              <a:t>1/30/2017</a:t>
+              <a:t>8/20/18</a:t>
             </a:fld>
             <a:endParaRPr lang="en-US"/>
           </a:p>
@@ -1152,7 +1152,7 @@
             <a:fld id="{1D8BD707-D9CF-40AE-B4C6-C98DA3205C09}" type="datetimeFigureOut">
               <a:rPr lang="en-US" smtClean="0"/>
               <a:pPr/>
-              <a:t>1/30/2017</a:t>
+              <a:t>8/20/18</a:t>
             </a:fld>
             <a:endParaRPr lang="en-US"/>
           </a:p>
@@ -1359,7 +1359,7 @@
             <a:fld id="{1D8BD707-D9CF-40AE-B4C6-C98DA3205C09}" type="datetimeFigureOut">
               <a:rPr lang="en-US" smtClean="0"/>
               <a:pPr/>
-              <a:t>1/30/2017</a:t>
+              <a:t>8/20/18</a:t>
             </a:fld>
             <a:endParaRPr lang="en-US"/>
           </a:p>
@@ -1566,7 +1566,7 @@
             <a:fld id="{1D8BD707-D9CF-40AE-B4C6-C98DA3205C09}" type="datetimeFigureOut">
               <a:rPr lang="en-US" smtClean="0"/>
               <a:pPr/>
-              <a:t>1/30/2017</a:t>
+              <a:t>8/20/18</a:t>
             </a:fld>
             <a:endParaRPr lang="en-US"/>
           </a:p>
@@ -1846,7 +1846,7 @@
             <a:fld id="{1D8BD707-D9CF-40AE-B4C6-C98DA3205C09}" type="datetimeFigureOut">
               <a:rPr lang="en-US" smtClean="0"/>
               <a:pPr/>
-              <a:t>1/30/2017</a:t>
+              <a:t>8/20/18</a:t>
             </a:fld>
             <a:endParaRPr lang="en-US"/>
           </a:p>
@@ -2176,7 +2176,7 @@
             <a:fld id="{1D8BD707-D9CF-40AE-B4C6-C98DA3205C09}" type="datetimeFigureOut">
               <a:rPr lang="en-US" smtClean="0"/>
               <a:pPr/>
-              <a:t>1/30/2017</a:t>
+              <a:t>8/20/18</a:t>
             </a:fld>
             <a:endParaRPr lang="en-US"/>
           </a:p>
@@ -2646,7 +2646,7 @@
             <a:fld id="{1D8BD707-D9CF-40AE-B4C6-C98DA3205C09}" type="datetimeFigureOut">
               <a:rPr lang="en-US" smtClean="0"/>
               <a:pPr/>
-              <a:t>1/30/2017</a:t>
+              <a:t>8/20/18</a:t>
             </a:fld>
             <a:endParaRPr lang="en-US"/>
           </a:p>
@@ -2793,7 +2793,7 @@
             <a:fld id="{1D8BD707-D9CF-40AE-B4C6-C98DA3205C09}" type="datetimeFigureOut">
               <a:rPr lang="en-US" smtClean="0"/>
               <a:pPr/>
-              <a:t>1/30/2017</a:t>
+              <a:t>8/20/18</a:t>
             </a:fld>
             <a:endParaRPr lang="en-US"/>
           </a:p>
@@ -2909,7 +2909,7 @@
             <a:fld id="{1D8BD707-D9CF-40AE-B4C6-C98DA3205C09}" type="datetimeFigureOut">
               <a:rPr lang="en-US" smtClean="0"/>
               <a:pPr/>
-              <a:t>1/30/2017</a:t>
+              <a:t>8/20/18</a:t>
             </a:fld>
             <a:endParaRPr lang="en-US"/>
           </a:p>
@@ -3216,7 +3216,7 @@
             <a:fld id="{1D8BD707-D9CF-40AE-B4C6-C98DA3205C09}" type="datetimeFigureOut">
               <a:rPr lang="en-US" smtClean="0"/>
               <a:pPr/>
-              <a:t>1/30/2017</a:t>
+              <a:t>8/20/18</a:t>
             </a:fld>
             <a:endParaRPr lang="en-US"/>
           </a:p>
@@ -3499,7 +3499,7 @@
             <a:fld id="{1D8BD707-D9CF-40AE-B4C6-C98DA3205C09}" type="datetimeFigureOut">
               <a:rPr lang="en-US" smtClean="0"/>
               <a:pPr/>
-              <a:t>1/30/2017</a:t>
+              <a:t>8/20/18</a:t>
             </a:fld>
             <a:endParaRPr lang="en-US"/>
           </a:p>
@@ -5825,6 +5825,48 @@
                 <a:schemeClr val="tx1">
                   <a:lumMod val="50000"/>
                   <a:lumOff val="50000"/>
+                </a:schemeClr>
+              </a:solidFill>
+            </a:endParaRPr>
+          </a:p>
+        </p:txBody>
+      </p:sp>
+      <p:sp>
+        <p:nvSpPr>
+          <p:cNvPr id="92" name="TextBox 91"/>
+          <p:cNvSpPr txBox="1"/>
+          <p:nvPr/>
+        </p:nvSpPr>
+        <p:spPr>
+          <a:xfrm>
+            <a:off x="8227645" y="3243264"/>
+            <a:ext cx="429067" cy="211027"/>
+          </a:xfrm>
+          <a:prstGeom prst="rect">
+            <a:avLst/>
+          </a:prstGeom>
+          <a:noFill/>
+        </p:spPr>
+        <p:txBody>
+          <a:bodyPr wrap="square" lIns="0" tIns="0" rIns="0" bIns="0" rtlCol="0" anchor="ctr" anchorCtr="0">
+            <a:noAutofit/>
+          </a:bodyPr>
+          <a:lstStyle/>
+          <a:p>
+            <a:r>
+              <a:rPr lang="en-US" sz="1600" dirty="0" smtClean="0">
+                <a:solidFill>
+                  <a:schemeClr val="accent6">
+                    <a:lumMod val="50000"/>
+                  </a:schemeClr>
+                </a:solidFill>
+              </a:rPr>
+              <a:t>0..1</a:t>
+            </a:r>
+            <a:endParaRPr lang="en-SG" sz="1600" dirty="0">
+              <a:solidFill>
+                <a:schemeClr val="accent6">
+                  <a:lumMod val="50000"/>
                 </a:schemeClr>
               </a:solidFill>
             </a:endParaRPr>

</xml_diff>

<commit_message>
[#9064] StudentProfile: Decouple storage CURD from AccountsDb and StudentsDb (#9066)
</commit_message>
<xml_diff>
--- a/docs/images/StorageClassDiagram.pptx
+++ b/docs/images/StorageClassDiagram.pptx
@@ -217,7 +217,7 @@
           <a:p>
             <a:fld id="{41BD1D1A-6182-4434-B651-E6786C99D69D}" type="datetimeFigureOut">
               <a:rPr lang="en-AU" smtClean="0"/>
-              <a:t>30/01/2017</a:t>
+              <a:t>20/8/18</a:t>
             </a:fld>
             <a:endParaRPr lang="en-AU"/>
           </a:p>
@@ -383,7 +383,7 @@
             <a:fld id="{AF301891-4E62-472A-98E9-95DBD40531A4}" type="datetimeFigureOut">
               <a:rPr lang="en-SG" smtClean="0"/>
               <a:pPr/>
-              <a:t>30/1/2017</a:t>
+              <a:t>20/8/18</a:t>
             </a:fld>
             <a:endParaRPr lang="en-SG"/>
           </a:p>
@@ -938,7 +938,7 @@
             <a:fld id="{1D8BD707-D9CF-40AE-B4C6-C98DA3205C09}" type="datetimeFigureOut">
               <a:rPr lang="en-US" smtClean="0"/>
               <a:pPr/>
-              <a:t>1/30/2017</a:t>
+              <a:t>8/20/18</a:t>
             </a:fld>
             <a:endParaRPr lang="en-US"/>
           </a:p>
@@ -1152,7 +1152,7 @@
             <a:fld id="{1D8BD707-D9CF-40AE-B4C6-C98DA3205C09}" type="datetimeFigureOut">
               <a:rPr lang="en-US" smtClean="0"/>
               <a:pPr/>
-              <a:t>1/30/2017</a:t>
+              <a:t>8/20/18</a:t>
             </a:fld>
             <a:endParaRPr lang="en-US"/>
           </a:p>
@@ -1359,7 +1359,7 @@
             <a:fld id="{1D8BD707-D9CF-40AE-B4C6-C98DA3205C09}" type="datetimeFigureOut">
               <a:rPr lang="en-US" smtClean="0"/>
               <a:pPr/>
-              <a:t>1/30/2017</a:t>
+              <a:t>8/20/18</a:t>
             </a:fld>
             <a:endParaRPr lang="en-US"/>
           </a:p>
@@ -1566,7 +1566,7 @@
             <a:fld id="{1D8BD707-D9CF-40AE-B4C6-C98DA3205C09}" type="datetimeFigureOut">
               <a:rPr lang="en-US" smtClean="0"/>
               <a:pPr/>
-              <a:t>1/30/2017</a:t>
+              <a:t>8/20/18</a:t>
             </a:fld>
             <a:endParaRPr lang="en-US"/>
           </a:p>
@@ -1846,7 +1846,7 @@
             <a:fld id="{1D8BD707-D9CF-40AE-B4C6-C98DA3205C09}" type="datetimeFigureOut">
               <a:rPr lang="en-US" smtClean="0"/>
               <a:pPr/>
-              <a:t>1/30/2017</a:t>
+              <a:t>8/20/18</a:t>
             </a:fld>
             <a:endParaRPr lang="en-US"/>
           </a:p>
@@ -2176,7 +2176,7 @@
             <a:fld id="{1D8BD707-D9CF-40AE-B4C6-C98DA3205C09}" type="datetimeFigureOut">
               <a:rPr lang="en-US" smtClean="0"/>
               <a:pPr/>
-              <a:t>1/30/2017</a:t>
+              <a:t>8/20/18</a:t>
             </a:fld>
             <a:endParaRPr lang="en-US"/>
           </a:p>
@@ -2646,7 +2646,7 @@
             <a:fld id="{1D8BD707-D9CF-40AE-B4C6-C98DA3205C09}" type="datetimeFigureOut">
               <a:rPr lang="en-US" smtClean="0"/>
               <a:pPr/>
-              <a:t>1/30/2017</a:t>
+              <a:t>8/20/18</a:t>
             </a:fld>
             <a:endParaRPr lang="en-US"/>
           </a:p>
@@ -2793,7 +2793,7 @@
             <a:fld id="{1D8BD707-D9CF-40AE-B4C6-C98DA3205C09}" type="datetimeFigureOut">
               <a:rPr lang="en-US" smtClean="0"/>
               <a:pPr/>
-              <a:t>1/30/2017</a:t>
+              <a:t>8/20/18</a:t>
             </a:fld>
             <a:endParaRPr lang="en-US"/>
           </a:p>
@@ -2909,7 +2909,7 @@
             <a:fld id="{1D8BD707-D9CF-40AE-B4C6-C98DA3205C09}" type="datetimeFigureOut">
               <a:rPr lang="en-US" smtClean="0"/>
               <a:pPr/>
-              <a:t>1/30/2017</a:t>
+              <a:t>8/20/18</a:t>
             </a:fld>
             <a:endParaRPr lang="en-US"/>
           </a:p>
@@ -3216,7 +3216,7 @@
             <a:fld id="{1D8BD707-D9CF-40AE-B4C6-C98DA3205C09}" type="datetimeFigureOut">
               <a:rPr lang="en-US" smtClean="0"/>
               <a:pPr/>
-              <a:t>1/30/2017</a:t>
+              <a:t>8/20/18</a:t>
             </a:fld>
             <a:endParaRPr lang="en-US"/>
           </a:p>
@@ -3499,7 +3499,7 @@
             <a:fld id="{1D8BD707-D9CF-40AE-B4C6-C98DA3205C09}" type="datetimeFigureOut">
               <a:rPr lang="en-US" smtClean="0"/>
               <a:pPr/>
-              <a:t>1/30/2017</a:t>
+              <a:t>8/20/18</a:t>
             </a:fld>
             <a:endParaRPr lang="en-US"/>
           </a:p>
@@ -5825,6 +5825,48 @@
                 <a:schemeClr val="tx1">
                   <a:lumMod val="50000"/>
                   <a:lumOff val="50000"/>
+                </a:schemeClr>
+              </a:solidFill>
+            </a:endParaRPr>
+          </a:p>
+        </p:txBody>
+      </p:sp>
+      <p:sp>
+        <p:nvSpPr>
+          <p:cNvPr id="92" name="TextBox 91"/>
+          <p:cNvSpPr txBox="1"/>
+          <p:nvPr/>
+        </p:nvSpPr>
+        <p:spPr>
+          <a:xfrm>
+            <a:off x="8227645" y="3243264"/>
+            <a:ext cx="429067" cy="211027"/>
+          </a:xfrm>
+          <a:prstGeom prst="rect">
+            <a:avLst/>
+          </a:prstGeom>
+          <a:noFill/>
+        </p:spPr>
+        <p:txBody>
+          <a:bodyPr wrap="square" lIns="0" tIns="0" rIns="0" bIns="0" rtlCol="0" anchor="ctr" anchorCtr="0">
+            <a:noAutofit/>
+          </a:bodyPr>
+          <a:lstStyle/>
+          <a:p>
+            <a:r>
+              <a:rPr lang="en-US" sz="1600" dirty="0" smtClean="0">
+                <a:solidFill>
+                  <a:schemeClr val="accent6">
+                    <a:lumMod val="50000"/>
+                  </a:schemeClr>
+                </a:solidFill>
+              </a:rPr>
+              <a:t>0..1</a:t>
+            </a:r>
+            <a:endParaRPr lang="en-SG" sz="1600" dirty="0">
+              <a:solidFill>
+                <a:schemeClr val="accent6">
+                  <a:lumMod val="50000"/>
                 </a:schemeClr>
               </a:solidFill>
             </a:endParaRPr>

</xml_diff>